<commit_message>
Update Task03-04 - Ärzte - Suchtpatienten.pptx
Scrumteil hinzufügen
</commit_message>
<xml_diff>
--- a/doc/task-04/Präsentation task 03 und 04/Task03-04 - Ärzte - Suchtpatienten.pptx
+++ b/doc/task-04/Präsentation task 03 und 04/Task03-04 - Ärzte - Suchtpatienten.pptx
@@ -5,7 +5,7 @@
     <p:sldMasterId id="2147483669" r:id="rId4"/>
   </p:sldMasterIdLst>
   <p:notesMasterIdLst>
-    <p:notesMasterId r:id="rId17"/>
+    <p:notesMasterId r:id="rId16"/>
   </p:notesMasterIdLst>
   <p:sldIdLst>
     <p:sldId id="256" r:id="rId5"/>
@@ -13,13 +13,12 @@
     <p:sldId id="259" r:id="rId7"/>
     <p:sldId id="260" r:id="rId8"/>
     <p:sldId id="261" r:id="rId9"/>
-    <p:sldId id="262" r:id="rId10"/>
-    <p:sldId id="263" r:id="rId11"/>
+    <p:sldId id="263" r:id="rId10"/>
+    <p:sldId id="262" r:id="rId11"/>
     <p:sldId id="264" r:id="rId12"/>
     <p:sldId id="265" r:id="rId13"/>
-    <p:sldId id="266" r:id="rId14"/>
-    <p:sldId id="295" r:id="rId15"/>
-    <p:sldId id="296" r:id="rId16"/>
+    <p:sldId id="295" r:id="rId14"/>
+    <p:sldId id="296" r:id="rId15"/>
   </p:sldIdLst>
   <p:sldSz cx="12207875" cy="6858000"/>
   <p:notesSz cx="6797675" cy="9872663"/>
@@ -258,7 +257,7 @@
               <a:pPr>
                 <a:defRPr/>
               </a:pPr>
-              <a:t>19.11.2019</a:t>
+              <a:t>21.11.2019</a:t>
             </a:fld>
             <a:endParaRPr lang="de-CH"/>
           </a:p>
@@ -1189,7 +1188,7 @@
               <a:pPr>
                 <a:defRPr/>
               </a:pPr>
-              <a:t>19.11.2019</a:t>
+              <a:t>21.11.2019</a:t>
             </a:fld>
             <a:r>
               <a:rPr lang="de-DE" sz="1000"/>
@@ -2627,7 +2626,7 @@
               <a:pPr>
                 <a:defRPr/>
               </a:pPr>
-              <a:t>19.11.2019</a:t>
+              <a:t>21.11.2019</a:t>
             </a:fld>
             <a:r>
               <a:rPr lang="de-DE" sz="1000"/>
@@ -6876,108 +6875,6 @@
           <a:chExt cx="0" cy="0"/>
         </a:xfrm>
       </p:grpSpPr>
-      <p:sp>
-        <p:nvSpPr>
-          <p:cNvPr id="2" name="Inhaltsplatzhalter 1">
-            <a:extLst>
-              <a:ext uri="{FF2B5EF4-FFF2-40B4-BE49-F238E27FC236}">
-                <a16:creationId xmlns:a16="http://schemas.microsoft.com/office/drawing/2014/main" id="{F2097155-76D2-4F79-BE71-96D58EDC9A09}"/>
-              </a:ext>
-            </a:extLst>
-          </p:cNvPr>
-          <p:cNvSpPr>
-            <a:spLocks noGrp="1"/>
-          </p:cNvSpPr>
-          <p:nvPr>
-            <p:ph sz="half" idx="1"/>
-          </p:nvPr>
-        </p:nvSpPr>
-        <p:spPr/>
-        <p:txBody>
-          <a:bodyPr/>
-          <a:lstStyle/>
-          <a:p>
-            <a:pPr marL="0" indent="0">
-              <a:buNone/>
-            </a:pPr>
-            <a:r>
-              <a:rPr lang="de-CH" dirty="0" err="1"/>
-              <a:t>Resource</a:t>
-            </a:r>
-            <a:r>
-              <a:rPr lang="de-CH" dirty="0"/>
-              <a:t> </a:t>
-            </a:r>
-            <a:r>
-              <a:rPr lang="de-CH" dirty="0" err="1"/>
-              <a:t>Planning</a:t>
-            </a:r>
-            <a:endParaRPr lang="de-CH" dirty="0"/>
-          </a:p>
-        </p:txBody>
-      </p:sp>
-      <p:sp>
-        <p:nvSpPr>
-          <p:cNvPr id="3" name="Titel 2">
-            <a:extLst>
-              <a:ext uri="{FF2B5EF4-FFF2-40B4-BE49-F238E27FC236}">
-                <a16:creationId xmlns:a16="http://schemas.microsoft.com/office/drawing/2014/main" id="{2A1A9CE2-A825-4C4E-B2DA-537B6B482230}"/>
-              </a:ext>
-            </a:extLst>
-          </p:cNvPr>
-          <p:cNvSpPr>
-            <a:spLocks noGrp="1"/>
-          </p:cNvSpPr>
-          <p:nvPr>
-            <p:ph type="ctrTitle"/>
-          </p:nvPr>
-        </p:nvSpPr>
-        <p:spPr/>
-        <p:txBody>
-          <a:bodyPr/>
-          <a:lstStyle/>
-          <a:p>
-            <a:r>
-              <a:rPr lang="de-CH" dirty="0" err="1"/>
-              <a:t>Scrum</a:t>
-            </a:r>
-            <a:r>
-              <a:rPr lang="de-CH" dirty="0"/>
-              <a:t> Setup (2)</a:t>
-            </a:r>
-          </a:p>
-        </p:txBody>
-      </p:sp>
-    </p:spTree>
-    <p:extLst>
-      <p:ext uri="{BB962C8B-B14F-4D97-AF65-F5344CB8AC3E}">
-        <p14:creationId xmlns:p14="http://schemas.microsoft.com/office/powerpoint/2010/main" val="3486036014"/>
-      </p:ext>
-    </p:extLst>
-  </p:cSld>
-  <p:clrMapOvr>
-    <a:masterClrMapping/>
-  </p:clrMapOvr>
-</p:sld>
-</file>
-
-<file path=ppt/slides/slide11.xml><?xml version="1.0" encoding="utf-8"?>
-<p:sld xmlns:a="http://schemas.openxmlformats.org/drawingml/2006/main" xmlns:r="http://schemas.openxmlformats.org/officeDocument/2006/relationships" xmlns:p="http://schemas.openxmlformats.org/presentationml/2006/main">
-  <p:cSld>
-    <p:spTree>
-      <p:nvGrpSpPr>
-        <p:cNvPr id="1" name=""/>
-        <p:cNvGrpSpPr/>
-        <p:nvPr/>
-      </p:nvGrpSpPr>
-      <p:grpSpPr>
-        <a:xfrm>
-          <a:off x="0" y="0"/>
-          <a:ext cx="0" cy="0"/>
-          <a:chOff x="0" y="0"/>
-          <a:chExt cx="0" cy="0"/>
-        </a:xfrm>
-      </p:grpSpPr>
       <p:pic>
         <p:nvPicPr>
           <p:cNvPr id="13" name="Grafik 12">
@@ -7090,7 +6987,7 @@
 </p:sld>
 </file>
 
-<file path=ppt/slides/slide12.xml><?xml version="1.0" encoding="utf-8"?>
+<file path=ppt/slides/slide11.xml><?xml version="1.0" encoding="utf-8"?>
 <p:sld xmlns:a="http://schemas.openxmlformats.org/drawingml/2006/main" xmlns:r="http://schemas.openxmlformats.org/officeDocument/2006/relationships" xmlns:p="http://schemas.openxmlformats.org/presentationml/2006/main">
   <p:cSld>
     <p:spTree>
@@ -7851,47 +7748,41 @@
                 <a:latin typeface="Lucida Sans" pitchFamily="34" charset="0"/>
                 <a:cs typeface="Lucida Sans Unicode" pitchFamily="34" charset="0"/>
               </a:rPr>
-              <a:t>High-level UML </a:t>
-            </a:r>
+              <a:t>General</a:t>
+            </a:r>
+            <a:br>
+              <a:rPr lang="de-CH" dirty="0">
+                <a:latin typeface="Lucida Sans" pitchFamily="34" charset="0"/>
+                <a:cs typeface="Lucida Sans Unicode" pitchFamily="34" charset="0"/>
+              </a:rPr>
+            </a:br>
+            <a:endParaRPr lang="de-CH" dirty="0">
+              <a:latin typeface="Lucida Sans" pitchFamily="34" charset="0"/>
+              <a:cs typeface="Lucida Sans Unicode" pitchFamily="34" charset="0"/>
+            </a:endParaRPr>
+          </a:p>
+          <a:p>
+            <a:pPr marL="457200" indent="-457200" eaLnBrk="1" hangingPunct="1">
+              <a:spcBef>
+                <a:spcPts val="0"/>
+              </a:spcBef>
+              <a:buFont typeface="+mj-lt"/>
+              <a:buAutoNum type="arabicPeriod"/>
+            </a:pPr>
             <a:r>
               <a:rPr lang="de-CH" dirty="0" err="1">
                 <a:latin typeface="Lucida Sans" pitchFamily="34" charset="0"/>
                 <a:cs typeface="Lucida Sans Unicode" pitchFamily="34" charset="0"/>
               </a:rPr>
-              <a:t>component</a:t>
+              <a:t>Product</a:t>
             </a:r>
             <a:r>
               <a:rPr lang="de-CH" dirty="0">
                 <a:latin typeface="Lucida Sans" pitchFamily="34" charset="0"/>
                 <a:cs typeface="Lucida Sans Unicode" pitchFamily="34" charset="0"/>
               </a:rPr>
-              <a:t> and </a:t>
-            </a:r>
-            <a:r>
-              <a:rPr lang="de-CH" dirty="0" err="1">
-                <a:latin typeface="Lucida Sans" pitchFamily="34" charset="0"/>
-                <a:cs typeface="Lucida Sans Unicode" pitchFamily="34" charset="0"/>
-              </a:rPr>
-              <a:t>deployment</a:t>
-            </a:r>
-            <a:r>
-              <a:rPr lang="de-CH" dirty="0">
-                <a:latin typeface="Lucida Sans" pitchFamily="34" charset="0"/>
-                <a:cs typeface="Lucida Sans Unicode" pitchFamily="34" charset="0"/>
-              </a:rPr>
-              <a:t> </a:t>
-            </a:r>
-            <a:r>
-              <a:rPr lang="de-CH" dirty="0" err="1">
-                <a:latin typeface="Lucida Sans" pitchFamily="34" charset="0"/>
-                <a:cs typeface="Lucida Sans Unicode" pitchFamily="34" charset="0"/>
-              </a:rPr>
-              <a:t>Diagram</a:t>
-            </a:r>
-            <a:endParaRPr lang="de-CH" dirty="0">
-              <a:latin typeface="Lucida Sans" pitchFamily="34" charset="0"/>
-              <a:cs typeface="Lucida Sans Unicode" pitchFamily="34" charset="0"/>
-            </a:endParaRPr>
+              <a:t> Backlog</a:t>
+            </a:r>
           </a:p>
           <a:p>
             <a:pPr marL="457200" indent="-457200" eaLnBrk="1" hangingPunct="1">
@@ -7915,130 +7806,11 @@
               <a:buAutoNum type="arabicPeriod"/>
             </a:pPr>
             <a:r>
-              <a:rPr lang="de-CH" dirty="0" err="1">
-                <a:latin typeface="Lucida Sans" pitchFamily="34" charset="0"/>
-                <a:cs typeface="Lucida Sans Unicode" pitchFamily="34" charset="0"/>
-              </a:rPr>
-              <a:t>Detailed</a:t>
-            </a:r>
-            <a:r>
               <a:rPr lang="de-CH" dirty="0">
                 <a:latin typeface="Lucida Sans" pitchFamily="34" charset="0"/>
                 <a:cs typeface="Lucida Sans Unicode" pitchFamily="34" charset="0"/>
               </a:rPr>
-              <a:t>: UML </a:t>
-            </a:r>
-            <a:r>
-              <a:rPr lang="de-CH" dirty="0" err="1">
-                <a:latin typeface="Lucida Sans" pitchFamily="34" charset="0"/>
-                <a:cs typeface="Lucida Sans Unicode" pitchFamily="34" charset="0"/>
-              </a:rPr>
-              <a:t>class</a:t>
-            </a:r>
-            <a:r>
-              <a:rPr lang="de-CH" dirty="0">
-                <a:latin typeface="Lucida Sans" pitchFamily="34" charset="0"/>
-                <a:cs typeface="Lucida Sans Unicode" pitchFamily="34" charset="0"/>
-              </a:rPr>
-              <a:t> </a:t>
-            </a:r>
-            <a:r>
-              <a:rPr lang="de-CH" dirty="0" err="1">
-                <a:latin typeface="Lucida Sans" pitchFamily="34" charset="0"/>
-                <a:cs typeface="Lucida Sans Unicode" pitchFamily="34" charset="0"/>
-              </a:rPr>
-              <a:t>diagram</a:t>
-            </a:r>
-            <a:r>
-              <a:rPr lang="de-CH" dirty="0">
-                <a:latin typeface="Lucida Sans" pitchFamily="34" charset="0"/>
-                <a:cs typeface="Lucida Sans Unicode" pitchFamily="34" charset="0"/>
-              </a:rPr>
-              <a:t> </a:t>
-            </a:r>
-            <a:r>
-              <a:rPr lang="de-CH" dirty="0" err="1">
-                <a:latin typeface="Lucida Sans" pitchFamily="34" charset="0"/>
-                <a:cs typeface="Lucida Sans Unicode" pitchFamily="34" charset="0"/>
-              </a:rPr>
-              <a:t>for</a:t>
-            </a:r>
-            <a:r>
-              <a:rPr lang="de-CH" dirty="0">
-                <a:latin typeface="Lucida Sans" pitchFamily="34" charset="0"/>
-                <a:cs typeface="Lucida Sans Unicode" pitchFamily="34" charset="0"/>
-              </a:rPr>
-              <a:t> </a:t>
-            </a:r>
-            <a:r>
-              <a:rPr lang="de-CH" dirty="0" err="1">
-                <a:latin typeface="Lucida Sans" pitchFamily="34" charset="0"/>
-                <a:cs typeface="Lucida Sans Unicode" pitchFamily="34" charset="0"/>
-              </a:rPr>
-              <a:t>main</a:t>
-            </a:r>
-            <a:r>
-              <a:rPr lang="de-CH" dirty="0">
-                <a:latin typeface="Lucida Sans" pitchFamily="34" charset="0"/>
-                <a:cs typeface="Lucida Sans Unicode" pitchFamily="34" charset="0"/>
-              </a:rPr>
-              <a:t> </a:t>
-            </a:r>
-            <a:r>
-              <a:rPr lang="de-CH" dirty="0" err="1">
-                <a:latin typeface="Lucida Sans" pitchFamily="34" charset="0"/>
-                <a:cs typeface="Lucida Sans Unicode" pitchFamily="34" charset="0"/>
-              </a:rPr>
-              <a:t>view</a:t>
-            </a:r>
-            <a:r>
-              <a:rPr lang="de-CH" dirty="0">
-                <a:latin typeface="Lucida Sans" pitchFamily="34" charset="0"/>
-                <a:cs typeface="Lucida Sans Unicode" pitchFamily="34" charset="0"/>
-              </a:rPr>
-              <a:t> </a:t>
-            </a:r>
-            <a:r>
-              <a:rPr lang="de-CH" dirty="0" err="1">
-                <a:latin typeface="Lucida Sans" pitchFamily="34" charset="0"/>
-                <a:cs typeface="Lucida Sans Unicode" pitchFamily="34" charset="0"/>
-              </a:rPr>
-              <a:t>of</a:t>
-            </a:r>
-            <a:r>
-              <a:rPr lang="de-CH" dirty="0">
-                <a:latin typeface="Lucida Sans" pitchFamily="34" charset="0"/>
-                <a:cs typeface="Lucida Sans Unicode" pitchFamily="34" charset="0"/>
-              </a:rPr>
-              <a:t> </a:t>
-            </a:r>
-            <a:r>
-              <a:rPr lang="de-CH" dirty="0" err="1">
-                <a:latin typeface="Lucida Sans" pitchFamily="34" charset="0"/>
-                <a:cs typeface="Lucida Sans Unicode" pitchFamily="34" charset="0"/>
-              </a:rPr>
-              <a:t>your</a:t>
-            </a:r>
-            <a:r>
-              <a:rPr lang="de-CH" dirty="0">
-                <a:latin typeface="Lucida Sans" pitchFamily="34" charset="0"/>
-                <a:cs typeface="Lucida Sans Unicode" pitchFamily="34" charset="0"/>
-              </a:rPr>
-              <a:t> </a:t>
-            </a:r>
-            <a:r>
-              <a:rPr lang="de-CH" dirty="0" err="1">
-                <a:latin typeface="Lucida Sans" pitchFamily="34" charset="0"/>
-                <a:cs typeface="Lucida Sans Unicode" pitchFamily="34" charset="0"/>
-              </a:rPr>
-              <a:t>application</a:t>
-            </a:r>
-            <a:r>
-              <a:rPr lang="de-CH" dirty="0">
-                <a:latin typeface="Lucida Sans" pitchFamily="34" charset="0"/>
-                <a:cs typeface="Lucida Sans Unicode" pitchFamily="34" charset="0"/>
-              </a:rPr>
-              <a:t> </a:t>
+              <a:t>Sprint Backlog</a:t>
             </a:r>
           </a:p>
         </p:txBody>
@@ -8073,31 +7845,38 @@
           <a:chExt cx="0" cy="0"/>
         </a:xfrm>
       </p:grpSpPr>
-      <p:sp>
-        <p:nvSpPr>
-          <p:cNvPr id="2" name="Inhaltsplatzhalter 1">
+      <p:pic>
+        <p:nvPicPr>
+          <p:cNvPr id="5" name="Inhaltsplatzhalter 4">
             <a:extLst>
               <a:ext uri="{FF2B5EF4-FFF2-40B4-BE49-F238E27FC236}">
-                <a16:creationId xmlns:a16="http://schemas.microsoft.com/office/drawing/2014/main" id="{F2097155-76D2-4F79-BE71-96D58EDC9A09}"/>
+                <a16:creationId xmlns:a16="http://schemas.microsoft.com/office/drawing/2014/main" id="{8BE62B78-F32C-4F87-9917-FF7091C5D227}"/>
               </a:ext>
             </a:extLst>
           </p:cNvPr>
-          <p:cNvSpPr>
-            <a:spLocks noGrp="1"/>
-          </p:cNvSpPr>
+          <p:cNvPicPr>
+            <a:picLocks noGrp="1" noChangeAspect="1"/>
+          </p:cNvPicPr>
           <p:nvPr>
             <p:ph sz="half" idx="1"/>
           </p:nvPr>
-        </p:nvSpPr>
-        <p:spPr/>
-        <p:txBody>
-          <a:bodyPr/>
-          <a:lstStyle/>
-          <a:p>
-            <a:endParaRPr lang="de-CH"/>
-          </a:p>
-        </p:txBody>
-      </p:sp>
+        </p:nvPicPr>
+        <p:blipFill>
+          <a:blip r:embed="rId2"/>
+          <a:stretch>
+            <a:fillRect/>
+          </a:stretch>
+        </p:blipFill>
+        <p:spPr>
+          <a:xfrm>
+            <a:off x="1405409" y="3172179"/>
+            <a:ext cx="9352608" cy="1107368"/>
+          </a:xfrm>
+          <a:prstGeom prst="rect">
+            <a:avLst/>
+          </a:prstGeom>
+        </p:spPr>
+      </p:pic>
       <p:sp>
         <p:nvSpPr>
           <p:cNvPr id="3" name="Titel 2">
@@ -8120,25 +7899,16 @@
           <a:lstStyle/>
           <a:p>
             <a:r>
-              <a:rPr lang="de-CH" dirty="0" err="1"/>
-              <a:t>Scrum</a:t>
-            </a:r>
-            <a:r>
               <a:rPr lang="de-CH" dirty="0"/>
-              <a:t> - </a:t>
-            </a:r>
-            <a:r>
-              <a:rPr lang="de-CH" dirty="0" err="1"/>
-              <a:t>Roles</a:t>
-            </a:r>
-            <a:endParaRPr lang="de-CH" dirty="0"/>
+              <a:t>General</a:t>
+            </a:r>
           </a:p>
         </p:txBody>
       </p:sp>
     </p:spTree>
     <p:extLst>
       <p:ext uri="{BB962C8B-B14F-4D97-AF65-F5344CB8AC3E}">
-        <p14:creationId xmlns:p14="http://schemas.microsoft.com/office/powerpoint/2010/main" val="2177142357"/>
+        <p14:creationId xmlns:p14="http://schemas.microsoft.com/office/powerpoint/2010/main" val="3692004433"/>
       </p:ext>
     </p:extLst>
   </p:cSld>
@@ -8167,31 +7937,6 @@
       </p:grpSpPr>
       <p:sp>
         <p:nvSpPr>
-          <p:cNvPr id="2" name="Inhaltsplatzhalter 1">
-            <a:extLst>
-              <a:ext uri="{FF2B5EF4-FFF2-40B4-BE49-F238E27FC236}">
-                <a16:creationId xmlns:a16="http://schemas.microsoft.com/office/drawing/2014/main" id="{F2097155-76D2-4F79-BE71-96D58EDC9A09}"/>
-              </a:ext>
-            </a:extLst>
-          </p:cNvPr>
-          <p:cNvSpPr>
-            <a:spLocks noGrp="1"/>
-          </p:cNvSpPr>
-          <p:nvPr>
-            <p:ph sz="half" idx="1"/>
-          </p:nvPr>
-        </p:nvSpPr>
-        <p:spPr/>
-        <p:txBody>
-          <a:bodyPr/>
-          <a:lstStyle/>
-          <a:p>
-            <a:endParaRPr lang="de-CH" dirty="0"/>
-          </a:p>
-        </p:txBody>
-      </p:sp>
-      <p:sp>
-        <p:nvSpPr>
           <p:cNvPr id="3" name="Titel 2">
             <a:extLst>
               <a:ext uri="{FF2B5EF4-FFF2-40B4-BE49-F238E27FC236}">
@@ -8213,32 +7958,56 @@
           <a:p>
             <a:r>
               <a:rPr lang="de-CH" dirty="0" err="1"/>
-              <a:t>Product</a:t>
+              <a:t>Scrum</a:t>
             </a:r>
             <a:r>
               <a:rPr lang="de-CH" dirty="0"/>
-              <a:t> </a:t>
+              <a:t> - </a:t>
             </a:r>
             <a:r>
               <a:rPr lang="de-CH" dirty="0" err="1"/>
-              <a:t>planning</a:t>
-            </a:r>
-            <a:r>
-              <a:rPr lang="de-CH" dirty="0"/>
-              <a:t> </a:t>
-            </a:r>
-            <a:r>
-              <a:rPr lang="de-CH" dirty="0" err="1"/>
-              <a:t>meeting</a:t>
+              <a:t>Roles</a:t>
             </a:r>
             <a:endParaRPr lang="de-CH" dirty="0"/>
           </a:p>
         </p:txBody>
       </p:sp>
+      <p:pic>
+        <p:nvPicPr>
+          <p:cNvPr id="4" name="Inhaltsplatzhalter 3">
+            <a:extLst>
+              <a:ext uri="{FF2B5EF4-FFF2-40B4-BE49-F238E27FC236}">
+                <a16:creationId xmlns:a16="http://schemas.microsoft.com/office/drawing/2014/main" id="{9AD9C7E3-F747-4F0C-9BAA-FBD72BE4B7F9}"/>
+              </a:ext>
+            </a:extLst>
+          </p:cNvPr>
+          <p:cNvPicPr>
+            <a:picLocks noGrp="1"/>
+          </p:cNvPicPr>
+          <p:nvPr>
+            <p:ph sz="half" idx="1"/>
+          </p:nvPr>
+        </p:nvPicPr>
+        <p:blipFill>
+          <a:blip r:embed="rId2"/>
+          <a:stretch>
+            <a:fillRect/>
+          </a:stretch>
+        </p:blipFill>
+        <p:spPr>
+          <a:xfrm>
+            <a:off x="2026003" y="1785903"/>
+            <a:ext cx="8111420" cy="3879920"/>
+          </a:xfrm>
+          <a:prstGeom prst="rect">
+            <a:avLst/>
+          </a:prstGeom>
+        </p:spPr>
+      </p:pic>
     </p:spTree>
     <p:extLst>
       <p:ext uri="{BB962C8B-B14F-4D97-AF65-F5344CB8AC3E}">
-        <p14:creationId xmlns:p14="http://schemas.microsoft.com/office/powerpoint/2010/main" val="3692004433"/>
+        <p14:creationId xmlns:p14="http://schemas.microsoft.com/office/powerpoint/2010/main" val="2177142357"/>
       </p:ext>
     </p:extLst>
   </p:cSld>
@@ -8265,34 +8034,38 @@
           <a:chExt cx="0" cy="0"/>
         </a:xfrm>
       </p:grpSpPr>
-      <p:sp>
-        <p:nvSpPr>
-          <p:cNvPr id="2" name="Inhaltsplatzhalter 1">
+      <p:pic>
+        <p:nvPicPr>
+          <p:cNvPr id="4" name="Inhaltsplatzhalter 3">
             <a:extLst>
               <a:ext uri="{FF2B5EF4-FFF2-40B4-BE49-F238E27FC236}">
-                <a16:creationId xmlns:a16="http://schemas.microsoft.com/office/drawing/2014/main" id="{F2097155-76D2-4F79-BE71-96D58EDC9A09}"/>
+                <a16:creationId xmlns:a16="http://schemas.microsoft.com/office/drawing/2014/main" id="{18C0503C-5474-47E1-A8F1-FFDBAE1A3970}"/>
               </a:ext>
             </a:extLst>
           </p:cNvPr>
-          <p:cNvSpPr>
-            <a:spLocks noGrp="1"/>
-          </p:cNvSpPr>
+          <p:cNvPicPr>
+            <a:picLocks noGrp="1" noChangeAspect="1"/>
+          </p:cNvPicPr>
           <p:nvPr>
             <p:ph sz="half" idx="1"/>
           </p:nvPr>
-        </p:nvSpPr>
-        <p:spPr/>
-        <p:txBody>
-          <a:bodyPr/>
-          <a:lstStyle/>
-          <a:p>
-            <a:pPr marL="0" indent="0">
-              <a:buNone/>
-            </a:pPr>
-            <a:endParaRPr lang="de-CH" dirty="0"/>
-          </a:p>
-        </p:txBody>
-      </p:sp>
+        </p:nvPicPr>
+        <p:blipFill>
+          <a:blip r:embed="rId2"/>
+          <a:stretch>
+            <a:fillRect/>
+          </a:stretch>
+        </p:blipFill>
+        <p:spPr>
+          <a:xfrm>
+            <a:off x="2043289" y="1145178"/>
+            <a:ext cx="8076846" cy="4901350"/>
+          </a:xfrm>
+          <a:prstGeom prst="rect">
+            <a:avLst/>
+          </a:prstGeom>
+        </p:spPr>
+      </p:pic>
       <p:sp>
         <p:nvSpPr>
           <p:cNvPr id="3" name="Titel 2">
@@ -8360,34 +8133,38 @@
           <a:chExt cx="0" cy="0"/>
         </a:xfrm>
       </p:grpSpPr>
-      <p:sp>
-        <p:nvSpPr>
-          <p:cNvPr id="2" name="Inhaltsplatzhalter 1">
+      <p:pic>
+        <p:nvPicPr>
+          <p:cNvPr id="4" name="Inhaltsplatzhalter 3">
             <a:extLst>
               <a:ext uri="{FF2B5EF4-FFF2-40B4-BE49-F238E27FC236}">
-                <a16:creationId xmlns:a16="http://schemas.microsoft.com/office/drawing/2014/main" id="{F2097155-76D2-4F79-BE71-96D58EDC9A09}"/>
+                <a16:creationId xmlns:a16="http://schemas.microsoft.com/office/drawing/2014/main" id="{0E5CCF12-25F8-42AA-A25D-BD43ACEA568A}"/>
               </a:ext>
             </a:extLst>
           </p:cNvPr>
-          <p:cNvSpPr>
-            <a:spLocks noGrp="1"/>
-          </p:cNvSpPr>
+          <p:cNvPicPr>
+            <a:picLocks noGrp="1" noChangeAspect="1"/>
+          </p:cNvPicPr>
           <p:nvPr>
             <p:ph sz="half" idx="1"/>
           </p:nvPr>
-        </p:nvSpPr>
-        <p:spPr/>
-        <p:txBody>
-          <a:bodyPr/>
-          <a:lstStyle/>
-          <a:p>
-            <a:pPr marL="0" indent="0">
-              <a:buNone/>
-            </a:pPr>
-            <a:endParaRPr lang="de-CH" dirty="0"/>
-          </a:p>
-        </p:txBody>
-      </p:sp>
+        </p:nvPicPr>
+        <p:blipFill>
+          <a:blip r:embed="rId2"/>
+          <a:stretch>
+            <a:fillRect/>
+          </a:stretch>
+        </p:blipFill>
+        <p:spPr>
+          <a:xfrm>
+            <a:off x="457200" y="1692179"/>
+            <a:ext cx="11249025" cy="4067368"/>
+          </a:xfrm>
+          <a:prstGeom prst="rect">
+            <a:avLst/>
+          </a:prstGeom>
+        </p:spPr>
+      </p:pic>
       <p:sp>
         <p:nvSpPr>
           <p:cNvPr id="3" name="Titel 2">
@@ -9045,12 +8822,9 @@
 </file>
 
 <file path=customXml/item1.xml><?xml version="1.0" encoding="utf-8"?>
-<?mso-contentType ?>
-<FormTemplates xmlns="http://schemas.microsoft.com/sharepoint/v3/contenttype/forms">
-  <Display>DocumentLibraryForm</Display>
-  <Edit>DocumentLibraryForm</Edit>
-  <New>DocumentLibraryForm</New>
-</FormTemplates>
+<p:properties xmlns:p="http://schemas.microsoft.com/office/2006/metadata/properties" xmlns:xsi="http://www.w3.org/2001/XMLSchema-instance" xmlns:pc="http://schemas.microsoft.com/office/infopath/2007/PartnerControls">
+  <documentManagement/>
+</p:properties>
 </file>
 
 <file path=customXml/item2.xml><?xml version="1.0" encoding="utf-8"?>
@@ -9186,15 +8960,26 @@
 </file>
 
 <file path=customXml/item3.xml><?xml version="1.0" encoding="utf-8"?>
-<p:properties xmlns:p="http://schemas.microsoft.com/office/2006/metadata/properties" xmlns:xsi="http://www.w3.org/2001/XMLSchema-instance" xmlns:pc="http://schemas.microsoft.com/office/infopath/2007/PartnerControls">
-  <documentManagement/>
-</p:properties>
+<?mso-contentType ?>
+<FormTemplates xmlns="http://schemas.microsoft.com/sharepoint/v3/contenttype/forms">
+  <Display>DocumentLibraryForm</Display>
+  <Edit>DocumentLibraryForm</Edit>
+  <New>DocumentLibraryForm</New>
+</FormTemplates>
 </file>
 
 <file path=customXml/itemProps1.xml><?xml version="1.0" encoding="utf-8"?>
-<ds:datastoreItem xmlns:ds="http://schemas.openxmlformats.org/officeDocument/2006/customXml" ds:itemID="{7D2542CC-467A-4770-BDA7-ADCFF09F6DBF}">
+<ds:datastoreItem xmlns:ds="http://schemas.openxmlformats.org/officeDocument/2006/customXml" ds:itemID="{66985437-8812-4ABE-89CE-3E49C89E0BF6}">
   <ds:schemaRefs>
-    <ds:schemaRef ds:uri="http://schemas.microsoft.com/sharepoint/v3/contenttype/forms"/>
+    <ds:schemaRef ds:uri="http://purl.org/dc/dcmitype/"/>
+    <ds:schemaRef ds:uri="de7f4a71-b510-446a-a776-c787f58d5553"/>
+    <ds:schemaRef ds:uri="http://purl.org/dc/elements/1.1/"/>
+    <ds:schemaRef ds:uri="http://schemas.microsoft.com/office/2006/metadata/properties"/>
+    <ds:schemaRef ds:uri="http://schemas.microsoft.com/office/2006/documentManagement/types"/>
+    <ds:schemaRef ds:uri="http://purl.org/dc/terms/"/>
+    <ds:schemaRef ds:uri="http://schemas.microsoft.com/office/infopath/2007/PartnerControls"/>
+    <ds:schemaRef ds:uri="http://schemas.openxmlformats.org/package/2006/metadata/core-properties"/>
+    <ds:schemaRef ds:uri="http://www.w3.org/XML/1998/namespace"/>
   </ds:schemaRefs>
 </ds:datastoreItem>
 </file>
@@ -9218,17 +9003,9 @@
 </file>
 
 <file path=customXml/itemProps3.xml><?xml version="1.0" encoding="utf-8"?>
-<ds:datastoreItem xmlns:ds="http://schemas.openxmlformats.org/officeDocument/2006/customXml" ds:itemID="{66985437-8812-4ABE-89CE-3E49C89E0BF6}">
+<ds:datastoreItem xmlns:ds="http://schemas.openxmlformats.org/officeDocument/2006/customXml" ds:itemID="{7D2542CC-467A-4770-BDA7-ADCFF09F6DBF}">
   <ds:schemaRefs>
-    <ds:schemaRef ds:uri="http://purl.org/dc/dcmitype/"/>
-    <ds:schemaRef ds:uri="de7f4a71-b510-446a-a776-c787f58d5553"/>
-    <ds:schemaRef ds:uri="http://purl.org/dc/elements/1.1/"/>
-    <ds:schemaRef ds:uri="http://schemas.microsoft.com/office/2006/metadata/properties"/>
-    <ds:schemaRef ds:uri="http://schemas.microsoft.com/office/2006/documentManagement/types"/>
-    <ds:schemaRef ds:uri="http://purl.org/dc/terms/"/>
-    <ds:schemaRef ds:uri="http://schemas.microsoft.com/office/infopath/2007/PartnerControls"/>
-    <ds:schemaRef ds:uri="http://schemas.openxmlformats.org/package/2006/metadata/core-properties"/>
-    <ds:schemaRef ds:uri="http://www.w3.org/XML/1998/namespace"/>
+    <ds:schemaRef ds:uri="http://schemas.microsoft.com/sharepoint/v3/contenttype/forms"/>
   </ds:schemaRefs>
 </ds:datastoreItem>
 </file>
</xml_diff>